<commit_message>
Jan 22, 2026, 10:04 AM
</commit_message>
<xml_diff>
--- a/Architecture/FSE Architecture.pptx
+++ b/Architecture/FSE Architecture.pptx
@@ -3763,8 +3763,13 @@
             <a:pPr algn="ctr"/>
             <a:r>
               <a:rPr lang="en-US" sz="1200" b="1" dirty="0"/>
-              <a:t>LLM Prediction</a:t>
-            </a:r>
+              <a:t>LLM </a:t>
+            </a:r>
+            <a:r>
+              <a:rPr lang="en-US" sz="1200" b="1"/>
+              <a:t>Answer Generation</a:t>
+            </a:r>
+            <a:endParaRPr lang="en-US" sz="1200" b="1" dirty="0"/>
           </a:p>
         </p:txBody>
       </p:sp>

</xml_diff>